<commit_message>
chore: adding / modifying data
</commit_message>
<xml_diff>
--- a/images/zzz_template.pptx
+++ b/images/zzz_template.pptx
@@ -298,7 +298,7 @@
           <a:p>
             <a:fld id="{6F36F2E6-1806-4461-B043-FDAD0D9A52EB}" type="datetimeFigureOut">
               <a:rPr lang="en-US" smtClean="0"/>
-              <a:t>11/18/2025</a:t>
+              <a:t>11/19/2025</a:t>
             </a:fld>
             <a:endParaRPr lang="en-US"/>
           </a:p>
@@ -496,7 +496,7 @@
           <a:p>
             <a:fld id="{6F36F2E6-1806-4461-B043-FDAD0D9A52EB}" type="datetimeFigureOut">
               <a:rPr lang="en-US" smtClean="0"/>
-              <a:t>11/18/2025</a:t>
+              <a:t>11/19/2025</a:t>
             </a:fld>
             <a:endParaRPr lang="en-US"/>
           </a:p>
@@ -704,7 +704,7 @@
           <a:p>
             <a:fld id="{6F36F2E6-1806-4461-B043-FDAD0D9A52EB}" type="datetimeFigureOut">
               <a:rPr lang="en-US" smtClean="0"/>
-              <a:t>11/18/2025</a:t>
+              <a:t>11/19/2025</a:t>
             </a:fld>
             <a:endParaRPr lang="en-US"/>
           </a:p>
@@ -943,7 +943,7 @@
           <a:p>
             <a:fld id="{6F36F2E6-1806-4461-B043-FDAD0D9A52EB}" type="datetimeFigureOut">
               <a:rPr lang="en-US" smtClean="0"/>
-              <a:t>11/18/2025</a:t>
+              <a:t>11/19/2025</a:t>
             </a:fld>
             <a:endParaRPr lang="en-US"/>
           </a:p>
@@ -1218,7 +1218,7 @@
           <a:p>
             <a:fld id="{6F36F2E6-1806-4461-B043-FDAD0D9A52EB}" type="datetimeFigureOut">
               <a:rPr lang="en-US" smtClean="0"/>
-              <a:t>11/18/2025</a:t>
+              <a:t>11/19/2025</a:t>
             </a:fld>
             <a:endParaRPr lang="en-US"/>
           </a:p>
@@ -1483,7 +1483,7 @@
           <a:p>
             <a:fld id="{6F36F2E6-1806-4461-B043-FDAD0D9A52EB}" type="datetimeFigureOut">
               <a:rPr lang="en-US" smtClean="0"/>
-              <a:t>11/18/2025</a:t>
+              <a:t>11/19/2025</a:t>
             </a:fld>
             <a:endParaRPr lang="en-US"/>
           </a:p>
@@ -1895,7 +1895,7 @@
           <a:p>
             <a:fld id="{6F36F2E6-1806-4461-B043-FDAD0D9A52EB}" type="datetimeFigureOut">
               <a:rPr lang="en-US" smtClean="0"/>
-              <a:t>11/18/2025</a:t>
+              <a:t>11/19/2025</a:t>
             </a:fld>
             <a:endParaRPr lang="en-US"/>
           </a:p>
@@ -2036,7 +2036,7 @@
           <a:p>
             <a:fld id="{6F36F2E6-1806-4461-B043-FDAD0D9A52EB}" type="datetimeFigureOut">
               <a:rPr lang="en-US" smtClean="0"/>
-              <a:t>11/18/2025</a:t>
+              <a:t>11/19/2025</a:t>
             </a:fld>
             <a:endParaRPr lang="en-US"/>
           </a:p>
@@ -2149,7 +2149,7 @@
           <a:p>
             <a:fld id="{6F36F2E6-1806-4461-B043-FDAD0D9A52EB}" type="datetimeFigureOut">
               <a:rPr lang="en-US" smtClean="0"/>
-              <a:t>11/18/2025</a:t>
+              <a:t>11/19/2025</a:t>
             </a:fld>
             <a:endParaRPr lang="en-US"/>
           </a:p>
@@ -2460,7 +2460,7 @@
           <a:p>
             <a:fld id="{6F36F2E6-1806-4461-B043-FDAD0D9A52EB}" type="datetimeFigureOut">
               <a:rPr lang="en-US" smtClean="0"/>
-              <a:t>11/18/2025</a:t>
+              <a:t>11/19/2025</a:t>
             </a:fld>
             <a:endParaRPr lang="en-US"/>
           </a:p>
@@ -2748,7 +2748,7 @@
           <a:p>
             <a:fld id="{6F36F2E6-1806-4461-B043-FDAD0D9A52EB}" type="datetimeFigureOut">
               <a:rPr lang="en-US" smtClean="0"/>
-              <a:t>11/18/2025</a:t>
+              <a:t>11/19/2025</a:t>
             </a:fld>
             <a:endParaRPr lang="en-US"/>
           </a:p>
@@ -2989,7 +2989,7 @@
           <a:p>
             <a:fld id="{6F36F2E6-1806-4461-B043-FDAD0D9A52EB}" type="datetimeFigureOut">
               <a:rPr lang="en-US" smtClean="0"/>
-              <a:t>11/18/2025</a:t>
+              <a:t>11/19/2025</a:t>
             </a:fld>
             <a:endParaRPr lang="en-US"/>
           </a:p>
@@ -3633,8 +3633,60 @@
         </p:nvSpPr>
         <p:spPr>
           <a:xfrm>
-            <a:off x="2084717" y="1449238"/>
-            <a:ext cx="8022566" cy="3959524"/>
+            <a:off x="2757513" y="3596714"/>
+            <a:ext cx="6794089" cy="3010703"/>
+          </a:xfrm>
+          <a:prstGeom prst="rect">
+            <a:avLst/>
+          </a:prstGeom>
+          <a:solidFill>
+            <a:schemeClr val="bg1"/>
+          </a:solidFill>
+          <a:ln>
+            <a:noFill/>
+          </a:ln>
+        </p:spPr>
+        <p:style>
+          <a:lnRef idx="2">
+            <a:schemeClr val="accent1">
+              <a:shade val="15000"/>
+            </a:schemeClr>
+          </a:lnRef>
+          <a:fillRef idx="1">
+            <a:schemeClr val="accent1"/>
+          </a:fillRef>
+          <a:effectRef idx="0">
+            <a:schemeClr val="accent1"/>
+          </a:effectRef>
+          <a:fontRef idx="minor">
+            <a:schemeClr val="lt1"/>
+          </a:fontRef>
+        </p:style>
+        <p:txBody>
+          <a:bodyPr rtlCol="0" anchor="ctr"/>
+          <a:lstStyle/>
+          <a:p>
+            <a:pPr algn="ctr"/>
+            <a:endParaRPr lang="en-US" dirty="0"/>
+          </a:p>
+        </p:txBody>
+      </p:sp>
+      <p:sp>
+        <p:nvSpPr>
+          <p:cNvPr id="11" name="Rectangle 10">
+            <a:extLst>
+              <a:ext uri="{FF2B5EF4-FFF2-40B4-BE49-F238E27FC236}">
+                <a16:creationId xmlns:a16="http://schemas.microsoft.com/office/drawing/2014/main" id="{CFD58CF9-C81E-DAE4-012C-5E18C6068DF3}"/>
+              </a:ext>
+            </a:extLst>
+          </p:cNvPr>
+          <p:cNvSpPr/>
+          <p:nvPr/>
+        </p:nvSpPr>
+        <p:spPr>
+          <a:xfrm>
+            <a:off x="3737702" y="250584"/>
+            <a:ext cx="4833711" cy="3010702"/>
           </a:xfrm>
           <a:prstGeom prst="rect">
             <a:avLst/>

</xml_diff>